<commit_message>
Added slide for week_3
</commit_message>
<xml_diff>
--- a/week_1/Probability Review.pptx
+++ b/week_1/Probability Review.pptx
@@ -216,7 +216,7 @@
           <a:p>
             <a:fld id="{F666E1FD-E7A0-497B-BBC0-740BAAC97C64}" type="datetimeFigureOut">
               <a:rPr lang="en-PH" smtClean="0"/>
-              <a:t>31/03/2023</a:t>
+              <a:t>04/04/2023</a:t>
             </a:fld>
             <a:endParaRPr lang="en-PH"/>
           </a:p>
@@ -1641,7 +1641,7 @@
           <a:p>
             <a:fld id="{0CCF0B81-6BD8-4C65-9459-815598C5F1F4}" type="datetimeFigureOut">
               <a:rPr lang="en-PH" smtClean="0"/>
-              <a:t>31/03/2023</a:t>
+              <a:t>04/04/2023</a:t>
             </a:fld>
             <a:endParaRPr lang="en-PH"/>
           </a:p>
@@ -1841,7 +1841,7 @@
           <a:p>
             <a:fld id="{0CCF0B81-6BD8-4C65-9459-815598C5F1F4}" type="datetimeFigureOut">
               <a:rPr lang="en-PH" smtClean="0"/>
-              <a:t>31/03/2023</a:t>
+              <a:t>04/04/2023</a:t>
             </a:fld>
             <a:endParaRPr lang="en-PH"/>
           </a:p>
@@ -2051,7 +2051,7 @@
           <a:p>
             <a:fld id="{0CCF0B81-6BD8-4C65-9459-815598C5F1F4}" type="datetimeFigureOut">
               <a:rPr lang="en-PH" smtClean="0"/>
-              <a:t>31/03/2023</a:t>
+              <a:t>04/04/2023</a:t>
             </a:fld>
             <a:endParaRPr lang="en-PH"/>
           </a:p>
@@ -2251,7 +2251,7 @@
           <a:p>
             <a:fld id="{0CCF0B81-6BD8-4C65-9459-815598C5F1F4}" type="datetimeFigureOut">
               <a:rPr lang="en-PH" smtClean="0"/>
-              <a:t>31/03/2023</a:t>
+              <a:t>04/04/2023</a:t>
             </a:fld>
             <a:endParaRPr lang="en-PH"/>
           </a:p>
@@ -2527,7 +2527,7 @@
           <a:p>
             <a:fld id="{0CCF0B81-6BD8-4C65-9459-815598C5F1F4}" type="datetimeFigureOut">
               <a:rPr lang="en-PH" smtClean="0"/>
-              <a:t>31/03/2023</a:t>
+              <a:t>04/04/2023</a:t>
             </a:fld>
             <a:endParaRPr lang="en-PH"/>
           </a:p>
@@ -2795,7 +2795,7 @@
           <a:p>
             <a:fld id="{0CCF0B81-6BD8-4C65-9459-815598C5F1F4}" type="datetimeFigureOut">
               <a:rPr lang="en-PH" smtClean="0"/>
-              <a:t>31/03/2023</a:t>
+              <a:t>04/04/2023</a:t>
             </a:fld>
             <a:endParaRPr lang="en-PH"/>
           </a:p>
@@ -3210,7 +3210,7 @@
           <a:p>
             <a:fld id="{0CCF0B81-6BD8-4C65-9459-815598C5F1F4}" type="datetimeFigureOut">
               <a:rPr lang="en-PH" smtClean="0"/>
-              <a:t>31/03/2023</a:t>
+              <a:t>04/04/2023</a:t>
             </a:fld>
             <a:endParaRPr lang="en-PH"/>
           </a:p>
@@ -3352,7 +3352,7 @@
           <a:p>
             <a:fld id="{0CCF0B81-6BD8-4C65-9459-815598C5F1F4}" type="datetimeFigureOut">
               <a:rPr lang="en-PH" smtClean="0"/>
-              <a:t>31/03/2023</a:t>
+              <a:t>04/04/2023</a:t>
             </a:fld>
             <a:endParaRPr lang="en-PH"/>
           </a:p>
@@ -3465,7 +3465,7 @@
           <a:p>
             <a:fld id="{0CCF0B81-6BD8-4C65-9459-815598C5F1F4}" type="datetimeFigureOut">
               <a:rPr lang="en-PH" smtClean="0"/>
-              <a:t>31/03/2023</a:t>
+              <a:t>04/04/2023</a:t>
             </a:fld>
             <a:endParaRPr lang="en-PH"/>
           </a:p>
@@ -3778,7 +3778,7 @@
           <a:p>
             <a:fld id="{0CCF0B81-6BD8-4C65-9459-815598C5F1F4}" type="datetimeFigureOut">
               <a:rPr lang="en-PH" smtClean="0"/>
-              <a:t>31/03/2023</a:t>
+              <a:t>04/04/2023</a:t>
             </a:fld>
             <a:endParaRPr lang="en-PH"/>
           </a:p>
@@ -4067,7 +4067,7 @@
           <a:p>
             <a:fld id="{0CCF0B81-6BD8-4C65-9459-815598C5F1F4}" type="datetimeFigureOut">
               <a:rPr lang="en-PH" smtClean="0"/>
-              <a:t>31/03/2023</a:t>
+              <a:t>04/04/2023</a:t>
             </a:fld>
             <a:endParaRPr lang="en-PH"/>
           </a:p>
@@ -4310,7 +4310,7 @@
           <a:p>
             <a:fld id="{0CCF0B81-6BD8-4C65-9459-815598C5F1F4}" type="datetimeFigureOut">
               <a:rPr lang="en-PH" smtClean="0"/>
-              <a:t>31/03/2023</a:t>
+              <a:t>04/04/2023</a:t>
             </a:fld>
             <a:endParaRPr lang="en-PH"/>
           </a:p>
@@ -5199,8 +5199,8 @@
           </a:p>
         </p:txBody>
       </p:sp>
-      <mc:AlternateContent xmlns:mc="http://schemas.openxmlformats.org/markup-compatibility/2006">
-        <mc:Choice xmlns:a14="http://schemas.microsoft.com/office/drawing/2010/main" Requires="a14">
+      <mc:AlternateContent xmlns:mc="http://schemas.openxmlformats.org/markup-compatibility/2006" xmlns:a14="http://schemas.microsoft.com/office/drawing/2010/main">
+        <mc:Choice Requires="a14">
           <p:sp>
             <p:nvSpPr>
               <p:cNvPr id="8" name="TextBox 7">
@@ -5274,7 +5274,7 @@
             </p:txBody>
           </p:sp>
         </mc:Choice>
-        <mc:Fallback>
+        <mc:Fallback xmlns="">
           <p:sp>
             <p:nvSpPr>
               <p:cNvPr id="8" name="TextBox 7">
@@ -5319,8 +5319,8 @@
           </p:sp>
         </mc:Fallback>
       </mc:AlternateContent>
-      <mc:AlternateContent xmlns:mc="http://schemas.openxmlformats.org/markup-compatibility/2006">
-        <mc:Choice xmlns:a14="http://schemas.microsoft.com/office/drawing/2010/main" Requires="a14">
+      <mc:AlternateContent xmlns:mc="http://schemas.openxmlformats.org/markup-compatibility/2006" xmlns:a14="http://schemas.microsoft.com/office/drawing/2010/main">
+        <mc:Choice Requires="a14">
           <p:sp>
             <p:nvSpPr>
               <p:cNvPr id="11" name="TextBox 10">
@@ -5430,7 +5430,7 @@
             </p:txBody>
           </p:sp>
         </mc:Choice>
-        <mc:Fallback>
+        <mc:Fallback xmlns="">
           <p:sp>
             <p:nvSpPr>
               <p:cNvPr id="11" name="TextBox 10">
@@ -6317,8 +6317,8 @@
           </a:p>
         </p:txBody>
       </p:sp>
-      <mc:AlternateContent xmlns:mc="http://schemas.openxmlformats.org/markup-compatibility/2006">
-        <mc:Choice xmlns:a14="http://schemas.microsoft.com/office/drawing/2010/main" Requires="a14">
+      <mc:AlternateContent xmlns:mc="http://schemas.openxmlformats.org/markup-compatibility/2006" xmlns:a14="http://schemas.microsoft.com/office/drawing/2010/main">
+        <mc:Choice Requires="a14">
           <p:sp>
             <p:nvSpPr>
               <p:cNvPr id="8" name="TextBox 7">
@@ -6434,7 +6434,7 @@
             </p:txBody>
           </p:sp>
         </mc:Choice>
-        <mc:Fallback>
+        <mc:Fallback xmlns="">
           <p:sp>
             <p:nvSpPr>
               <p:cNvPr id="8" name="TextBox 7">
@@ -6479,8 +6479,8 @@
           </p:sp>
         </mc:Fallback>
       </mc:AlternateContent>
-      <mc:AlternateContent xmlns:mc="http://schemas.openxmlformats.org/markup-compatibility/2006">
-        <mc:Choice xmlns:a14="http://schemas.microsoft.com/office/drawing/2010/main" Requires="a14">
+      <mc:AlternateContent xmlns:mc="http://schemas.openxmlformats.org/markup-compatibility/2006" xmlns:a14="http://schemas.microsoft.com/office/drawing/2010/main">
+        <mc:Choice Requires="a14">
           <p:sp>
             <p:nvSpPr>
               <p:cNvPr id="11" name="TextBox 10">
@@ -6550,7 +6550,7 @@
             </p:txBody>
           </p:sp>
         </mc:Choice>
-        <mc:Fallback>
+        <mc:Fallback xmlns="">
           <p:sp>
             <p:nvSpPr>
               <p:cNvPr id="11" name="TextBox 10">
@@ -7335,8 +7335,8 @@
           </a:p>
         </p:txBody>
       </p:sp>
-      <mc:AlternateContent xmlns:mc="http://schemas.openxmlformats.org/markup-compatibility/2006">
-        <mc:Choice xmlns:a14="http://schemas.microsoft.com/office/drawing/2010/main" Requires="a14">
+      <mc:AlternateContent xmlns:mc="http://schemas.openxmlformats.org/markup-compatibility/2006" xmlns:a14="http://schemas.microsoft.com/office/drawing/2010/main">
+        <mc:Choice Requires="a14">
           <p:sp>
             <p:nvSpPr>
               <p:cNvPr id="8" name="TextBox 7">
@@ -7446,7 +7446,7 @@
             </p:txBody>
           </p:sp>
         </mc:Choice>
-        <mc:Fallback>
+        <mc:Fallback xmlns="">
           <p:sp>
             <p:nvSpPr>
               <p:cNvPr id="8" name="TextBox 7">
@@ -7491,8 +7491,8 @@
           </p:sp>
         </mc:Fallback>
       </mc:AlternateContent>
-      <mc:AlternateContent xmlns:mc="http://schemas.openxmlformats.org/markup-compatibility/2006">
-        <mc:Choice xmlns:a14="http://schemas.microsoft.com/office/drawing/2010/main" Requires="a14">
+      <mc:AlternateContent xmlns:mc="http://schemas.openxmlformats.org/markup-compatibility/2006" xmlns:a14="http://schemas.microsoft.com/office/drawing/2010/main">
+        <mc:Choice Requires="a14">
           <p:sp>
             <p:nvSpPr>
               <p:cNvPr id="11" name="TextBox 10">
@@ -7562,7 +7562,7 @@
             </p:txBody>
           </p:sp>
         </mc:Choice>
-        <mc:Fallback>
+        <mc:Fallback xmlns="">
           <p:sp>
             <p:nvSpPr>
               <p:cNvPr id="11" name="TextBox 10">
@@ -10241,8 +10241,8 @@
           </a:p>
         </p:txBody>
       </p:sp>
-      <mc:AlternateContent xmlns:mc="http://schemas.openxmlformats.org/markup-compatibility/2006" xmlns:a14="http://schemas.microsoft.com/office/drawing/2010/main">
-        <mc:Choice Requires="a14">
+      <mc:AlternateContent xmlns:mc="http://schemas.openxmlformats.org/markup-compatibility/2006">
+        <mc:Choice xmlns:a14="http://schemas.microsoft.com/office/drawing/2010/main" Requires="a14">
           <p:sp>
             <p:nvSpPr>
               <p:cNvPr id="5" name="TextBox 4">
@@ -10299,17 +10299,10 @@
                 </a:r>
                 <a:r>
                   <a:rPr lang="en-PH" sz="5000" dirty="0"/>
-                  <a:t>≤</a:t>
+                  <a:t>≤ </a:t>
                 </a:r>
                 <a14:m>
                   <m:oMath xmlns:m="http://schemas.openxmlformats.org/officeDocument/2006/math">
-                    <m:r>
-                      <a:rPr lang="en-PH" sz="5000" b="0" i="0" dirty="0" smtClean="0">
-                        <a:latin typeface="Cambria Math" panose="02040503050406030204" pitchFamily="18" charset="0"/>
-                        <a:ea typeface="Cambria Math" panose="02040503050406030204" pitchFamily="18" charset="0"/>
-                      </a:rPr>
-                      <m:t> </m:t>
-                    </m:r>
                     <m:r>
                       <a:rPr lang="en-PH" sz="5000" i="1" dirty="0" smtClean="0">
                         <a:latin typeface="Cambria Math" panose="02040503050406030204" pitchFamily="18" charset="0"/>
@@ -10346,7 +10339,7 @@
                 </a:r>
                 <a:r>
                   <a:rPr lang="en-PH" sz="5000" dirty="0"/>
-                  <a:t>≥</a:t>
+                  <a:t>≤</a:t>
                 </a:r>
                 <a:r>
                   <a:rPr lang="en-PH" sz="5000" dirty="0">
@@ -10430,7 +10423,7 @@
             </p:txBody>
           </p:sp>
         </mc:Choice>
-        <mc:Fallback xmlns="">
+        <mc:Fallback>
           <p:sp>
             <p:nvSpPr>
               <p:cNvPr id="5" name="TextBox 4">

</xml_diff>